<commit_message>
Přidání hypertextovéhých odkazů do PDF výstupů a konverze do ODP pro Martina.
</commit_message>
<xml_diff>
--- a/flyers/skoleni-qgis-pokrocily.pptx
+++ b/flyers/skoleni-qgis-pokrocily.pptx
@@ -3175,11 +3175,6 @@
               </a:rPr>
               <a:t>Kurz</a:t>
             </a:r>
-            <a:endParaRPr lang="cs-CZ" sz="3200" b="1" dirty="0" smtClean="0">
-              <a:solidFill>
-                <a:schemeClr val="tx2"/>
-              </a:solidFill>
-            </a:endParaRPr>
           </a:p>
           <a:p>
             <a:pPr algn="r"/>
@@ -3283,14 +3278,6 @@
               </a:rPr>
               <a:t> informací s využitím širokého sortimentu zásuvných modulů včetně využívání analytickým možností GRASS GIS.</a:t>
             </a:r>
-            <a:endParaRPr lang="cs-CZ" sz="1100" dirty="0" smtClean="0">
-              <a:solidFill>
-                <a:schemeClr val="tx1">
-                  <a:lumMod val="50000"/>
-                  <a:lumOff val="50000"/>
-                </a:schemeClr>
-              </a:solidFill>
-            </a:endParaRPr>
           </a:p>
         </p:txBody>
       </p:sp>
@@ -3449,40 +3436,7 @@
                   </a:schemeClr>
                 </a:solidFill>
               </a:rPr>
-              <a:t>Maximální počet účastníků kurzu: </a:t>
-            </a:r>
-            <a:r>
-              <a:rPr lang="cs-CZ" sz="1100" dirty="0" smtClean="0">
-                <a:solidFill>
-                  <a:schemeClr val="tx1">
-                    <a:lumMod val="50000"/>
-                    <a:lumOff val="50000"/>
-                  </a:schemeClr>
-                </a:solidFill>
-              </a:rPr>
-              <a:t>8</a:t>
-            </a:r>
-            <a:r>
-              <a:rPr lang="cs-CZ" sz="1100" dirty="0" smtClean="0">
-                <a:solidFill>
-                  <a:schemeClr val="tx1">
-                    <a:lumMod val="50000"/>
-                    <a:lumOff val="50000"/>
-                  </a:schemeClr>
-                </a:solidFill>
-              </a:rPr>
-              <a:t> </a:t>
-            </a:r>
-            <a:r>
-              <a:rPr lang="cs-CZ" sz="1100" dirty="0" smtClean="0">
-                <a:solidFill>
-                  <a:schemeClr val="tx1">
-                    <a:lumMod val="50000"/>
-                    <a:lumOff val="50000"/>
-                  </a:schemeClr>
-                </a:solidFill>
-              </a:rPr>
-              <a:t>osob</a:t>
+              <a:t>Maximální počet účastníků kurzu: 8 osob</a:t>
             </a:r>
           </a:p>
         </p:txBody>
@@ -3565,6 +3519,7 @@
                 <a:solidFill>
                   <a:schemeClr val="tx2"/>
                 </a:solidFill>
+                <a:hlinkClick r:id="rId4"/>
               </a:rPr>
               <a:t>http://</a:t>
             </a:r>
@@ -3573,6 +3528,7 @@
                 <a:solidFill>
                   <a:schemeClr val="tx2"/>
                 </a:solidFill>
+                <a:hlinkClick r:id="rId4"/>
               </a:rPr>
               <a:t>www.</a:t>
             </a:r>
@@ -3581,6 +3537,7 @@
                 <a:solidFill>
                   <a:schemeClr val="tx2"/>
                 </a:solidFill>
+                <a:hlinkClick r:id="rId4"/>
               </a:rPr>
               <a:t>gismentors.eu</a:t>
             </a:r>
@@ -3589,6 +3546,7 @@
                 <a:solidFill>
                   <a:schemeClr val="tx2"/>
                 </a:solidFill>
+                <a:hlinkClick r:id="rId4"/>
               </a:rPr>
               <a:t>/</a:t>
             </a:r>
@@ -3597,6 +3555,7 @@
                 <a:solidFill>
                   <a:schemeClr val="tx2"/>
                 </a:solidFill>
+                <a:hlinkClick r:id="rId4"/>
               </a:rPr>
               <a:t>skoleni</a:t>
             </a:r>
@@ -3605,6 +3564,7 @@
                 <a:solidFill>
                   <a:schemeClr val="tx2"/>
                 </a:solidFill>
+                <a:hlinkClick r:id="rId4"/>
               </a:rPr>
               <a:t>/</a:t>
             </a:r>
@@ -3613,6 +3573,7 @@
                 <a:solidFill>
                   <a:schemeClr val="tx2"/>
                 </a:solidFill>
+                <a:hlinkClick r:id="rId4"/>
               </a:rPr>
               <a:t>qgis</a:t>
             </a:r>
@@ -3669,6 +3630,7 @@
                 <a:solidFill>
                   <a:schemeClr val="tx2"/>
                 </a:solidFill>
+                <a:hlinkClick r:id="rId4"/>
               </a:rPr>
               <a:t>http</a:t>
             </a:r>
@@ -3677,6 +3639,7 @@
                 <a:solidFill>
                   <a:schemeClr val="tx2"/>
                 </a:solidFill>
+                <a:hlinkClick r:id="rId4"/>
               </a:rPr>
               <a:t>://</a:t>
             </a:r>
@@ -3685,6 +3648,7 @@
                 <a:solidFill>
                   <a:schemeClr val="tx2"/>
                 </a:solidFill>
+                <a:hlinkClick r:id="rId4"/>
               </a:rPr>
               <a:t>www.</a:t>
             </a:r>
@@ -3693,6 +3657,7 @@
                 <a:solidFill>
                   <a:schemeClr val="tx2"/>
                 </a:solidFill>
+                <a:hlinkClick r:id="rId4"/>
               </a:rPr>
               <a:t>gismentors.eu</a:t>
             </a:r>
@@ -3701,6 +3666,7 @@
                 <a:solidFill>
                   <a:schemeClr val="tx2"/>
                 </a:solidFill>
+                <a:hlinkClick r:id="rId4"/>
               </a:rPr>
               <a:t>/</a:t>
             </a:r>
@@ -3709,6 +3675,7 @@
                 <a:solidFill>
                   <a:schemeClr val="tx2"/>
                 </a:solidFill>
+                <a:hlinkClick r:id="rId4"/>
               </a:rPr>
               <a:t>skoleni</a:t>
             </a:r>
@@ -3717,6 +3684,7 @@
                 <a:solidFill>
                   <a:schemeClr val="tx2"/>
                 </a:solidFill>
+                <a:hlinkClick r:id="rId4"/>
               </a:rPr>
               <a:t>/</a:t>
             </a:r>
@@ -3725,6 +3693,7 @@
                 <a:solidFill>
                   <a:schemeClr val="tx2"/>
                 </a:solidFill>
+                <a:hlinkClick r:id="rId4"/>
               </a:rPr>
               <a:t>qgis</a:t>
             </a:r>
@@ -3745,7 +3714,7 @@
           <p:nvPr/>
         </p:nvPicPr>
         <p:blipFill>
-          <a:blip r:embed="rId4" cstate="print"/>
+          <a:blip r:embed="rId5" cstate="print"/>
           <a:srcRect/>
           <a:stretch>
             <a:fillRect/>
@@ -3841,29 +3810,7 @@
                   </a:schemeClr>
                 </a:solidFill>
               </a:rPr>
-              <a:t> Transformace dat, změna souřadnicového systému, </a:t>
-            </a:r>
-            <a:r>
-              <a:rPr lang="cs-CZ" sz="1100" dirty="0" smtClean="0">
-                <a:solidFill>
-                  <a:schemeClr val="tx1">
-                    <a:lumMod val="50000"/>
-                    <a:lumOff val="50000"/>
-                  </a:schemeClr>
-                </a:solidFill>
-              </a:rPr>
-              <a:t> prostorové analýzy</a:t>
-            </a:r>
-            <a:r>
-              <a:rPr lang="cs-CZ" sz="1100" dirty="0" smtClean="0">
-                <a:solidFill>
-                  <a:schemeClr val="tx1">
-                    <a:lumMod val="50000"/>
-                    <a:lumOff val="50000"/>
-                  </a:schemeClr>
-                </a:solidFill>
-              </a:rPr>
-              <a:t>, síťové analýzy, statistiky vytvářené z prostorových dat</a:t>
+              <a:t> Transformace dat, změna souřadnicového systému,  prostorové analýzy, síťové analýzy, statistiky vytvářené z prostorových dat</a:t>
             </a:r>
             <a:endParaRPr lang="en-US" sz="1100" dirty="0" smtClean="0">
               <a:solidFill>
@@ -4111,7 +4058,7 @@
           <p:nvPr/>
         </p:nvPicPr>
         <p:blipFill>
-          <a:blip r:embed="rId5" cstate="print"/>
+          <a:blip r:embed="rId6" cstate="print"/>
           <a:srcRect/>
           <a:stretch>
             <a:fillRect/>
@@ -4150,7 +4097,7 @@
           <p:nvPr/>
         </p:nvPicPr>
         <p:blipFill>
-          <a:blip r:embed="rId6" cstate="print"/>
+          <a:blip r:embed="rId7" cstate="print"/>
           <a:srcRect/>
           <a:stretch>
             <a:fillRect/>
@@ -4189,7 +4136,7 @@
           <p:nvPr/>
         </p:nvPicPr>
         <p:blipFill>
-          <a:blip r:embed="rId7" cstate="print"/>
+          <a:blip r:embed="rId8" cstate="print"/>
           <a:srcRect/>
           <a:stretch>
             <a:fillRect/>

</xml_diff>